<commit_message>
[docs] Fix typo in cdm16 presentation
</commit_message>
<xml_diff>
--- a/docs/cdm16/cdm16.pptx
+++ b/docs/cdm16/cdm16.pptx
@@ -301,7 +301,7 @@
           <a:p>
             <a:fld id="{ADB94A70-B629-D349-92B2-39ED3847A1B5}" type="datetimeFigureOut">
               <a:rPr lang="ru-RU" smtClean="0"/>
-              <a:t>05.03.2023</a:t>
+              <a:t>20.03.2023</a:t>
             </a:fld>
             <a:endParaRPr lang="ru-RU"/>
           </a:p>
@@ -499,7 +499,7 @@
           <a:p>
             <a:fld id="{ADB94A70-B629-D349-92B2-39ED3847A1B5}" type="datetimeFigureOut">
               <a:rPr lang="ru-RU" smtClean="0"/>
-              <a:t>05.03.2023</a:t>
+              <a:t>20.03.2023</a:t>
             </a:fld>
             <a:endParaRPr lang="ru-RU"/>
           </a:p>
@@ -707,7 +707,7 @@
           <a:p>
             <a:fld id="{ADB94A70-B629-D349-92B2-39ED3847A1B5}" type="datetimeFigureOut">
               <a:rPr lang="ru-RU" smtClean="0"/>
-              <a:t>05.03.2023</a:t>
+              <a:t>20.03.2023</a:t>
             </a:fld>
             <a:endParaRPr lang="ru-RU"/>
           </a:p>
@@ -905,7 +905,7 @@
           <a:p>
             <a:fld id="{ADB94A70-B629-D349-92B2-39ED3847A1B5}" type="datetimeFigureOut">
               <a:rPr lang="ru-RU" smtClean="0"/>
-              <a:t>05.03.2023</a:t>
+              <a:t>20.03.2023</a:t>
             </a:fld>
             <a:endParaRPr lang="ru-RU"/>
           </a:p>
@@ -1180,7 +1180,7 @@
           <a:p>
             <a:fld id="{ADB94A70-B629-D349-92B2-39ED3847A1B5}" type="datetimeFigureOut">
               <a:rPr lang="ru-RU" smtClean="0"/>
-              <a:t>05.03.2023</a:t>
+              <a:t>20.03.2023</a:t>
             </a:fld>
             <a:endParaRPr lang="ru-RU"/>
           </a:p>
@@ -1445,7 +1445,7 @@
           <a:p>
             <a:fld id="{ADB94A70-B629-D349-92B2-39ED3847A1B5}" type="datetimeFigureOut">
               <a:rPr lang="ru-RU" smtClean="0"/>
-              <a:t>05.03.2023</a:t>
+              <a:t>20.03.2023</a:t>
             </a:fld>
             <a:endParaRPr lang="ru-RU"/>
           </a:p>
@@ -1857,7 +1857,7 @@
           <a:p>
             <a:fld id="{ADB94A70-B629-D349-92B2-39ED3847A1B5}" type="datetimeFigureOut">
               <a:rPr lang="ru-RU" smtClean="0"/>
-              <a:t>05.03.2023</a:t>
+              <a:t>20.03.2023</a:t>
             </a:fld>
             <a:endParaRPr lang="ru-RU"/>
           </a:p>
@@ -1998,7 +1998,7 @@
           <a:p>
             <a:fld id="{ADB94A70-B629-D349-92B2-39ED3847A1B5}" type="datetimeFigureOut">
               <a:rPr lang="ru-RU" smtClean="0"/>
-              <a:t>05.03.2023</a:t>
+              <a:t>20.03.2023</a:t>
             </a:fld>
             <a:endParaRPr lang="ru-RU"/>
           </a:p>
@@ -2111,7 +2111,7 @@
           <a:p>
             <a:fld id="{ADB94A70-B629-D349-92B2-39ED3847A1B5}" type="datetimeFigureOut">
               <a:rPr lang="ru-RU" smtClean="0"/>
-              <a:t>05.03.2023</a:t>
+              <a:t>20.03.2023</a:t>
             </a:fld>
             <a:endParaRPr lang="ru-RU"/>
           </a:p>
@@ -2422,7 +2422,7 @@
           <a:p>
             <a:fld id="{ADB94A70-B629-D349-92B2-39ED3847A1B5}" type="datetimeFigureOut">
               <a:rPr lang="ru-RU" smtClean="0"/>
-              <a:t>05.03.2023</a:t>
+              <a:t>20.03.2023</a:t>
             </a:fld>
             <a:endParaRPr lang="ru-RU"/>
           </a:p>
@@ -2710,7 +2710,7 @@
           <a:p>
             <a:fld id="{ADB94A70-B629-D349-92B2-39ED3847A1B5}" type="datetimeFigureOut">
               <a:rPr lang="ru-RU" smtClean="0"/>
-              <a:t>05.03.2023</a:t>
+              <a:t>20.03.2023</a:t>
             </a:fld>
             <a:endParaRPr lang="ru-RU"/>
           </a:p>
@@ -2951,7 +2951,7 @@
           <a:p>
             <a:fld id="{ADB94A70-B629-D349-92B2-39ED3847A1B5}" type="datetimeFigureOut">
               <a:rPr lang="ru-RU" smtClean="0"/>
-              <a:t>05.03.2023</a:t>
+              <a:t>20.03.2023</a:t>
             </a:fld>
             <a:endParaRPr lang="ru-RU"/>
           </a:p>
@@ -7272,12 +7272,8 @@
               <a:t>Для </a:t>
             </a:r>
             <a:r>
-              <a:rPr lang="en-US" dirty="0" err="1"/>
-              <a:t>ldc</a:t>
-            </a:r>
-            <a:r>
-              <a:rPr lang="en-US" dirty="0"/>
-              <a:t> </a:t>
+              <a:rPr lang="en-US" dirty="0"/>
+              <a:t>lc* </a:t>
             </a:r>
             <a:r>
               <a:rPr lang="ru-RU" dirty="0"/>
@@ -11143,7 +11139,7 @@
             <a:pPr lvl="1"/>
             <a:r>
               <a:rPr lang="en-US" dirty="0"/>
-              <a:t>Lc* rs0, rs1, </a:t>
+              <a:t>lc* rs0, rs1, </a:t>
             </a:r>
             <a:r>
               <a:rPr lang="en-US" dirty="0" err="1"/>
@@ -11186,7 +11182,7 @@
             <a:pPr lvl="1"/>
             <a:r>
               <a:rPr lang="en-US" dirty="0"/>
-              <a:t>Ls*/ss* </a:t>
+              <a:t>ls*/ss* </a:t>
             </a:r>
             <a:r>
               <a:rPr lang="en-US" dirty="0" err="1"/>
@@ -11209,7 +11205,7 @@
             <a:pPr lvl="1"/>
             <a:r>
               <a:rPr lang="en-US" dirty="0" err="1"/>
-              <a:t>Ldi</a:t>
+              <a:t>ldi</a:t>
             </a:r>
             <a:r>
               <a:rPr lang="en-US" dirty="0"/>
@@ -12194,7 +12190,7 @@
               <a:rPr lang="en" sz="1600" dirty="0">
                 <a:latin typeface="Lucida Console" panose="020B0609040504020204" pitchFamily="49" charset="0"/>
               </a:rPr>
-              <a:t>dc main, 0 # Startup/Reset vector </a:t>
+              <a:t>dc main, 0 	       # Startup/Reset vector </a:t>
             </a:r>
           </a:p>
           <a:p>

</xml_diff>